<commit_message>
Some general ML terms
</commit_message>
<xml_diff>
--- a/other/meetings/28_3_23.pptx
+++ b/other/meetings/28_3_23.pptx
@@ -108,6 +108,11 @@
       </a:defRPr>
     </a:lvl9pPr>
   </p:defaultTextStyle>
+  <p:extLst>
+    <p:ext uri="{EFAFB233-063F-42B5-8137-9DF3F51BA10A}">
+      <p15:sldGuideLst xmlns:p15="http://schemas.microsoft.com/office/powerpoint/2012/main"/>
+    </p:ext>
+  </p:extLst>
 </p:presentation>
 </file>
 
@@ -242,7 +247,7 @@
           <a:p>
             <a:fld id="{1311EDF5-7D36-4510-A0DD-311BEECDF2C8}" type="datetimeFigureOut">
               <a:rPr lang="en-US" smtClean="0"/>
-              <a:t>3/21/2023</a:t>
+              <a:t>3/27/2023</a:t>
             </a:fld>
             <a:endParaRPr lang="en-US"/>
           </a:p>
@@ -412,7 +417,7 @@
           <a:p>
             <a:fld id="{1311EDF5-7D36-4510-A0DD-311BEECDF2C8}" type="datetimeFigureOut">
               <a:rPr lang="en-US" smtClean="0"/>
-              <a:t>3/21/2023</a:t>
+              <a:t>3/27/2023</a:t>
             </a:fld>
             <a:endParaRPr lang="en-US"/>
           </a:p>
@@ -592,7 +597,7 @@
           <a:p>
             <a:fld id="{1311EDF5-7D36-4510-A0DD-311BEECDF2C8}" type="datetimeFigureOut">
               <a:rPr lang="en-US" smtClean="0"/>
-              <a:t>3/21/2023</a:t>
+              <a:t>3/27/2023</a:t>
             </a:fld>
             <a:endParaRPr lang="en-US"/>
           </a:p>
@@ -762,7 +767,7 @@
           <a:p>
             <a:fld id="{1311EDF5-7D36-4510-A0DD-311BEECDF2C8}" type="datetimeFigureOut">
               <a:rPr lang="en-US" smtClean="0"/>
-              <a:t>3/21/2023</a:t>
+              <a:t>3/27/2023</a:t>
             </a:fld>
             <a:endParaRPr lang="en-US"/>
           </a:p>
@@ -1008,7 +1013,7 @@
           <a:p>
             <a:fld id="{1311EDF5-7D36-4510-A0DD-311BEECDF2C8}" type="datetimeFigureOut">
               <a:rPr lang="en-US" smtClean="0"/>
-              <a:t>3/21/2023</a:t>
+              <a:t>3/27/2023</a:t>
             </a:fld>
             <a:endParaRPr lang="en-US"/>
           </a:p>
@@ -1240,7 +1245,7 @@
           <a:p>
             <a:fld id="{1311EDF5-7D36-4510-A0DD-311BEECDF2C8}" type="datetimeFigureOut">
               <a:rPr lang="en-US" smtClean="0"/>
-              <a:t>3/21/2023</a:t>
+              <a:t>3/27/2023</a:t>
             </a:fld>
             <a:endParaRPr lang="en-US"/>
           </a:p>
@@ -1607,7 +1612,7 @@
           <a:p>
             <a:fld id="{1311EDF5-7D36-4510-A0DD-311BEECDF2C8}" type="datetimeFigureOut">
               <a:rPr lang="en-US" smtClean="0"/>
-              <a:t>3/21/2023</a:t>
+              <a:t>3/27/2023</a:t>
             </a:fld>
             <a:endParaRPr lang="en-US"/>
           </a:p>
@@ -1725,7 +1730,7 @@
           <a:p>
             <a:fld id="{1311EDF5-7D36-4510-A0DD-311BEECDF2C8}" type="datetimeFigureOut">
               <a:rPr lang="en-US" smtClean="0"/>
-              <a:t>3/21/2023</a:t>
+              <a:t>3/27/2023</a:t>
             </a:fld>
             <a:endParaRPr lang="en-US"/>
           </a:p>
@@ -1820,7 +1825,7 @@
           <a:p>
             <a:fld id="{1311EDF5-7D36-4510-A0DD-311BEECDF2C8}" type="datetimeFigureOut">
               <a:rPr lang="en-US" smtClean="0"/>
-              <a:t>3/21/2023</a:t>
+              <a:t>3/27/2023</a:t>
             </a:fld>
             <a:endParaRPr lang="en-US"/>
           </a:p>
@@ -2097,7 +2102,7 @@
           <a:p>
             <a:fld id="{1311EDF5-7D36-4510-A0DD-311BEECDF2C8}" type="datetimeFigureOut">
               <a:rPr lang="en-US" smtClean="0"/>
-              <a:t>3/21/2023</a:t>
+              <a:t>3/27/2023</a:t>
             </a:fld>
             <a:endParaRPr lang="en-US"/>
           </a:p>
@@ -2350,7 +2355,7 @@
           <a:p>
             <a:fld id="{1311EDF5-7D36-4510-A0DD-311BEECDF2C8}" type="datetimeFigureOut">
               <a:rPr lang="en-US" smtClean="0"/>
-              <a:t>3/21/2023</a:t>
+              <a:t>3/27/2023</a:t>
             </a:fld>
             <a:endParaRPr lang="en-US"/>
           </a:p>
@@ -2563,7 +2568,7 @@
           <a:p>
             <a:fld id="{1311EDF5-7D36-4510-A0DD-311BEECDF2C8}" type="datetimeFigureOut">
               <a:rPr lang="en-US" smtClean="0"/>
-              <a:t>3/21/2023</a:t>
+              <a:t>3/27/2023</a:t>
             </a:fld>
             <a:endParaRPr lang="en-US"/>
           </a:p>
@@ -3553,7 +3558,15 @@
             </a:r>
             <a:r>
               <a:rPr lang="da-DK" dirty="0" smtClean="0"/>
-              <a:t>: MSE</a:t>
+              <a:t>: MSE (</a:t>
+            </a:r>
+            <a:r>
+              <a:rPr lang="da-DK" dirty="0" err="1" smtClean="0"/>
+              <a:t>maybe</a:t>
+            </a:r>
+            <a:r>
+              <a:rPr lang="da-DK" dirty="0" smtClean="0"/>
+              <a:t> MAE?)</a:t>
             </a:r>
           </a:p>
           <a:p>
@@ -3567,7 +3580,6 @@
               <a:rPr lang="da-DK" dirty="0" smtClean="0"/>
               <a:t>Evaluation: PCK@0.2</a:t>
             </a:r>
-            <a:endParaRPr lang="da-DK" dirty="0" smtClean="0"/>
           </a:p>
           <a:p>
             <a:endParaRPr lang="en-US" dirty="0"/>
@@ -3662,8 +3674,17 @@
             </a:r>
             <a:r>
               <a:rPr lang="da-DK" dirty="0" smtClean="0"/>
-              <a:t>, 3, 3)</a:t>
-            </a:r>
+              <a:t>, </a:t>
+            </a:r>
+            <a:r>
+              <a:rPr lang="da-DK" dirty="0" smtClean="0"/>
+              <a:t>5</a:t>
+            </a:r>
+            <a:r>
+              <a:rPr lang="da-DK" smtClean="0"/>
+              <a:t>, 5)</a:t>
+            </a:r>
+            <a:endParaRPr lang="da-DK" dirty="0" smtClean="0"/>
           </a:p>
           <a:p>
             <a:r>
@@ -3680,6 +3701,9 @@
               <a:rPr lang="da-DK" dirty="0" smtClean="0"/>
               <a:t>: ”same”</a:t>
             </a:r>
+          </a:p>
+          <a:p>
+            <a:endParaRPr lang="da-DK" dirty="0" smtClean="0"/>
           </a:p>
           <a:p>
             <a:r>
@@ -3777,23 +3801,57 @@
           <a:p>
             <a:r>
               <a:rPr lang="da-DK" dirty="0" smtClean="0"/>
-              <a:t>RNN-type: LSTM</a:t>
-            </a:r>
-          </a:p>
-          <a:p>
-            <a:r>
-              <a:rPr lang="da-DK" dirty="0" err="1" smtClean="0"/>
-              <a:t>Bidirectional</a:t>
-            </a:r>
-            <a:r>
-              <a:rPr lang="da-DK" dirty="0" smtClean="0"/>
-              <a:t>: True (addition)</a:t>
-            </a:r>
-          </a:p>
-          <a:p>
-            <a:r>
-              <a:rPr lang="da-DK" dirty="0" smtClean="0"/>
-              <a:t>Training-time: 30min/</a:t>
+              <a:t>RNN-type: LSTM/GRU</a:t>
+            </a:r>
+          </a:p>
+          <a:p>
+            <a:r>
+              <a:rPr lang="da-DK" dirty="0" err="1" smtClean="0"/>
+              <a:t>Direction</a:t>
+            </a:r>
+            <a:r>
+              <a:rPr lang="da-DK" dirty="0" smtClean="0"/>
+              <a:t>: </a:t>
+            </a:r>
+            <a:r>
+              <a:rPr lang="da-DK" dirty="0" err="1" smtClean="0"/>
+              <a:t>unidirectional</a:t>
+            </a:r>
+            <a:r>
+              <a:rPr lang="da-DK" dirty="0" smtClean="0"/>
+              <a:t>/</a:t>
+            </a:r>
+            <a:r>
+              <a:rPr lang="da-DK" dirty="0" err="1" smtClean="0"/>
+              <a:t>bidirection</a:t>
+            </a:r>
+            <a:r>
+              <a:rPr lang="da-DK" dirty="0" smtClean="0"/>
+              <a:t> (addition)</a:t>
+            </a:r>
+          </a:p>
+          <a:p>
+            <a:endParaRPr lang="da-DK" dirty="0" smtClean="0"/>
+          </a:p>
+          <a:p>
+            <a:r>
+              <a:rPr lang="da-DK" dirty="0" smtClean="0"/>
+              <a:t>Training-time: </a:t>
+            </a:r>
+          </a:p>
+          <a:p>
+            <a:pPr lvl="1"/>
+            <a:r>
+              <a:rPr lang="da-DK" dirty="0" smtClean="0"/>
+              <a:t>LSTM/</a:t>
+            </a:r>
+            <a:r>
+              <a:rPr lang="da-DK" dirty="0" err="1" smtClean="0"/>
+              <a:t>bidirection</a:t>
+            </a:r>
+            <a:r>
+              <a:rPr lang="da-DK" dirty="0" smtClean="0"/>
+              <a:t>: 30min/</a:t>
             </a:r>
             <a:r>
               <a:rPr lang="da-DK" dirty="0" err="1" smtClean="0"/>
@@ -3802,18 +3860,12 @@
             <a:endParaRPr lang="da-DK" dirty="0"/>
           </a:p>
           <a:p>
-            <a:endParaRPr lang="da-DK" dirty="0" smtClean="0"/>
-          </a:p>
-          <a:p>
             <a:endParaRPr lang="da-DK" dirty="0"/>
           </a:p>
           <a:p>
-            <a:pPr marL="0" indent="0">
-              <a:buNone/>
-            </a:pPr>
-            <a:r>
-              <a:rPr lang="da-DK" dirty="0" err="1" smtClean="0"/>
-              <a:t>Other</a:t>
+            <a:r>
+              <a:rPr lang="da-DK" dirty="0" err="1" smtClean="0"/>
+              <a:t>Preferred</a:t>
             </a:r>
             <a:r>
               <a:rPr lang="da-DK" dirty="0" smtClean="0"/>
@@ -3821,7 +3873,7 @@
             </a:r>
             <a:r>
               <a:rPr lang="da-DK" dirty="0" err="1" smtClean="0"/>
-              <a:t>setups</a:t>
+              <a:t>setup</a:t>
             </a:r>
             <a:r>
               <a:rPr lang="da-DK" dirty="0" smtClean="0"/>
@@ -3906,7 +3958,7 @@
           <a:p>
             <a:r>
               <a:rPr lang="da-DK" dirty="0" smtClean="0"/>
-              <a:t>Sample-interval: 4 - (</a:t>
+              <a:t>Sample-interval: 4; (</a:t>
             </a:r>
             <a:r>
               <a:rPr lang="en-US" dirty="0" smtClean="0"/>
@@ -4003,7 +4055,7 @@
           <a:p>
             <a:r>
               <a:rPr lang="da-DK" dirty="0" smtClean="0"/>
-              <a:t>Training-time: 100min/</a:t>
+              <a:t>Training-time: 50min/</a:t>
             </a:r>
             <a:r>
               <a:rPr lang="da-DK" dirty="0" err="1" smtClean="0"/>

</xml_diff>